<commit_message>
Adding and fixing functionality
</commit_message>
<xml_diff>
--- a/SIC_C&P_Hackathon Presentation Slide Template.pptx
+++ b/SIC_C&P_Hackathon Presentation Slide Template.pptx
@@ -17,48 +17,25 @@
   <p:notesSz cx="6858000" cy="9144000"/>
   <p:embeddedFontLst>
     <p:embeddedFont>
-      <p:font typeface="맑은 고딕" panose="020B0503020000020004" pitchFamily="50" charset="-127"/>
+      <p:font typeface="맑은 고딕" panose="020B0503020000020004" pitchFamily="34" charset="-127"/>
       <p:regular r:id="rId7"/>
       <p:bold r:id="rId8"/>
     </p:embeddedFont>
     <p:embeddedFont>
-      <p:font typeface="SamsungOne 400C" panose="020B0506030303020204" pitchFamily="34" charset="0"/>
-      <p:regular r:id="rId9"/>
+      <p:font typeface="Samsung Sharp Sans" panose="020B0604020202020204" charset="0"/>
+      <p:bold r:id="rId9"/>
     </p:embeddedFont>
     <p:embeddedFont>
-      <p:font typeface="Samsung Sharp Sans" pitchFamily="2" charset="0"/>
-      <p:bold r:id="rId10"/>
+      <p:font typeface="SamsungOne 400" panose="020B0503030303020204"/>
+      <p:regular r:id="rId10"/>
     </p:embeddedFont>
     <p:embeddedFont>
-      <p:font typeface="SamsungOneKorean 400" panose="020B0503030303020204" pitchFamily="50" charset="-127"/>
+      <p:font typeface="SamsungOne 400C" panose="020B0506030303020204"/>
       <p:regular r:id="rId11"/>
     </p:embeddedFont>
     <p:embeddedFont>
-      <p:font typeface="Samsung Sharp Sans Medium" pitchFamily="2" charset="0"/>
+      <p:font typeface="SamsungOne 700" panose="020B0803030303020204"/>
       <p:bold r:id="rId12"/>
-    </p:embeddedFont>
-    <p:embeddedFont>
-      <p:font typeface="Calibri" panose="020F0502020204030204" pitchFamily="34" charset="0"/>
-      <p:regular r:id="rId13"/>
-      <p:bold r:id="rId14"/>
-      <p:italic r:id="rId15"/>
-      <p:boldItalic r:id="rId16"/>
-    </p:embeddedFont>
-    <p:embeddedFont>
-      <p:font typeface="SamsungOne 700" panose="020B0803030303020204" pitchFamily="34" charset="0"/>
-      <p:bold r:id="rId17"/>
-    </p:embeddedFont>
-    <p:embeddedFont>
-      <p:font typeface="Arial Unicode MS" panose="020B0604020202020204" pitchFamily="50" charset="-127"/>
-      <p:regular r:id="rId18"/>
-    </p:embeddedFont>
-    <p:embeddedFont>
-      <p:font typeface="Samsung Sharp Sans Bold" pitchFamily="2" charset="0"/>
-      <p:bold r:id="rId19"/>
-    </p:embeddedFont>
-    <p:embeddedFont>
-      <p:font typeface="SamsungOne 400" panose="020B0503030303020204" pitchFamily="34" charset="0"/>
-      <p:regular r:id="rId20"/>
     </p:embeddedFont>
   </p:embeddedFontLst>
   <p:defaultTextStyle>
@@ -257,7 +234,7 @@
           <a:p>
             <a:fld id="{E8B57C17-E6FD-4AF5-A787-31E9CCE99A85}" type="datetimeFigureOut">
               <a:rPr lang="ko-KR" altLang="en-US" smtClean="0"/>
-              <a:t>2023-09-06</a:t>
+              <a:t>2024-10-21</a:t>
             </a:fld>
             <a:endParaRPr lang="ko-KR" altLang="en-US" dirty="0"/>
           </a:p>
@@ -415,7 +392,7 @@
           <a:p>
             <a:fld id="{5B59C55F-00F1-4985-9065-F2D92AE05D03}" type="slidenum">
               <a:rPr lang="ko-KR" altLang="en-US" smtClean="0"/>
-              <a:t>‹#›</a:t>
+              <a:t>‹Nº›</a:t>
             </a:fld>
             <a:endParaRPr lang="ko-KR" altLang="en-US" dirty="0"/>
           </a:p>
@@ -546,7 +523,7 @@
           <p:cNvPr id="12" name="직선 연결선 11">
             <a:extLst>
               <a:ext uri="{FF2B5EF4-FFF2-40B4-BE49-F238E27FC236}">
-                <a16:creationId xmlns="" xmlns:a16="http://schemas.microsoft.com/office/drawing/2014/main" id="{107951CE-0A5B-4EC7-B663-290867B6A3B2}"/>
+                <a16:creationId xmlns:a16="http://schemas.microsoft.com/office/drawing/2014/main" id="{107951CE-0A5B-4EC7-B663-290867B6A3B2}"/>
               </a:ext>
             </a:extLst>
           </p:cNvPr>
@@ -589,7 +566,7 @@
           <p:cNvPr id="13" name="슬라이드 번호 개체 틀 15">
             <a:extLst>
               <a:ext uri="{FF2B5EF4-FFF2-40B4-BE49-F238E27FC236}">
-                <a16:creationId xmlns="" xmlns:a16="http://schemas.microsoft.com/office/drawing/2014/main" id="{DB8B1220-1660-457F-B990-656A8230EA54}"/>
+                <a16:creationId xmlns:a16="http://schemas.microsoft.com/office/drawing/2014/main" id="{DB8B1220-1660-457F-B990-656A8230EA54}"/>
               </a:ext>
             </a:extLst>
           </p:cNvPr>
@@ -756,7 +733,7 @@
                 <a:tabLst/>
                 <a:defRPr/>
               </a:pPr>
-              <a:t>‹#›</a:t>
+              <a:t>‹Nº›</a:t>
             </a:fld>
             <a:endParaRPr lang="en-US" altLang="ko-KR" sz="900" dirty="0">
               <a:solidFill>
@@ -776,7 +753,7 @@
           <p:cNvPr id="14" name="직사각형 7">
             <a:extLst>
               <a:ext uri="{FF2B5EF4-FFF2-40B4-BE49-F238E27FC236}">
-                <a16:creationId xmlns="" xmlns:a16="http://schemas.microsoft.com/office/drawing/2014/main" id="{AA07D337-B9C3-4E5E-811E-AEFBB17ADEF5}"/>
+                <a16:creationId xmlns:a16="http://schemas.microsoft.com/office/drawing/2014/main" id="{AA07D337-B9C3-4E5E-811E-AEFBB17ADEF5}"/>
               </a:ext>
             </a:extLst>
           </p:cNvPr>
@@ -847,7 +824,7 @@
           <p:cNvPr id="15" name="슬라이드 번호 개체 틀 15">
             <a:extLst>
               <a:ext uri="{FF2B5EF4-FFF2-40B4-BE49-F238E27FC236}">
-                <a16:creationId xmlns="" xmlns:a16="http://schemas.microsoft.com/office/drawing/2014/main" id="{CCEC8F59-794B-4743-A6D7-1BC9720006CB}"/>
+                <a16:creationId xmlns:a16="http://schemas.microsoft.com/office/drawing/2014/main" id="{CCEC8F59-794B-4743-A6D7-1BC9720006CB}"/>
               </a:ext>
             </a:extLst>
           </p:cNvPr>
@@ -1080,7 +1057,7 @@
           <p:cNvPr id="5" name="Freeform 5">
             <a:extLst>
               <a:ext uri="{FF2B5EF4-FFF2-40B4-BE49-F238E27FC236}">
-                <a16:creationId xmlns="" xmlns:a16="http://schemas.microsoft.com/office/drawing/2014/main" id="{0D8AEED9-5E8F-4A4F-8427-AE314BEC60F8}"/>
+                <a16:creationId xmlns:a16="http://schemas.microsoft.com/office/drawing/2014/main" id="{0D8AEED9-5E8F-4A4F-8427-AE314BEC60F8}"/>
               </a:ext>
             </a:extLst>
           </p:cNvPr>
@@ -2111,7 +2088,7 @@
           <p:cNvPr id="6" name="Freeform 5">
             <a:extLst>
               <a:ext uri="{FF2B5EF4-FFF2-40B4-BE49-F238E27FC236}">
-                <a16:creationId xmlns="" xmlns:a16="http://schemas.microsoft.com/office/drawing/2014/main" id="{0D8AEED9-5E8F-4A4F-8427-AE314BEC60F8}"/>
+                <a16:creationId xmlns:a16="http://schemas.microsoft.com/office/drawing/2014/main" id="{0D8AEED9-5E8F-4A4F-8427-AE314BEC60F8}"/>
               </a:ext>
             </a:extLst>
           </p:cNvPr>
@@ -3072,7 +3049,7 @@
           <p:cNvPr id="7" name="직사각형 133">
             <a:extLst>
               <a:ext uri="{FF2B5EF4-FFF2-40B4-BE49-F238E27FC236}">
-                <a16:creationId xmlns="" xmlns:a16="http://schemas.microsoft.com/office/drawing/2014/main" id="{DE8CAD59-3F29-4FBB-AE0A-697DDFD5E69E}"/>
+                <a16:creationId xmlns:a16="http://schemas.microsoft.com/office/drawing/2014/main" id="{DE8CAD59-3F29-4FBB-AE0A-697DDFD5E69E}"/>
               </a:ext>
             </a:extLst>
           </p:cNvPr>
@@ -3125,7 +3102,7 @@
               <a:defRPr/>
             </a:pPr>
             <a:r>
-              <a:rPr lang="en-US" altLang="ko-KR" sz="2400" baseline="0" dirty="0" smtClean="0">
+              <a:rPr lang="en-US" altLang="ko-KR" sz="2400" baseline="0" dirty="0">
                 <a:solidFill>
                   <a:srgbClr val="1428A0"/>
                 </a:solidFill>
@@ -3133,29 +3110,7 @@
                 <a:ea typeface="Samsung Sharp Sans" pitchFamily="2" charset="0"/>
                 <a:cs typeface="Samsung Sharp Sans" pitchFamily="2" charset="0"/>
               </a:rPr>
-              <a:t>Coding </a:t>
-            </a:r>
-            <a:r>
-              <a:rPr lang="en-US" altLang="ko-KR" sz="2400" baseline="0" dirty="0" smtClean="0">
-                <a:solidFill>
-                  <a:srgbClr val="1428A0"/>
-                </a:solidFill>
-                <a:latin typeface="Samsung Sharp Sans" pitchFamily="2" charset="0"/>
-                <a:ea typeface="Samsung Sharp Sans" pitchFamily="2" charset="0"/>
-                <a:cs typeface="Samsung Sharp Sans" pitchFamily="2" charset="0"/>
-              </a:rPr>
-              <a:t>and </a:t>
-            </a:r>
-            <a:r>
-              <a:rPr lang="en-US" altLang="ko-KR" sz="2400" baseline="0" dirty="0" smtClean="0">
-                <a:solidFill>
-                  <a:srgbClr val="1428A0"/>
-                </a:solidFill>
-                <a:latin typeface="Samsung Sharp Sans" pitchFamily="2" charset="0"/>
-                <a:ea typeface="Samsung Sharp Sans" pitchFamily="2" charset="0"/>
-                <a:cs typeface="Samsung Sharp Sans" pitchFamily="2" charset="0"/>
-              </a:rPr>
-              <a:t>Programming Course</a:t>
+              <a:t>Coding and Programming Course</a:t>
             </a:r>
             <a:endParaRPr lang="ko-KR" altLang="en-US" sz="2400" dirty="0">
               <a:solidFill>
@@ -3173,7 +3128,7 @@
           <p:cNvPr id="8" name="직사각형 7">
             <a:extLst>
               <a:ext uri="{FF2B5EF4-FFF2-40B4-BE49-F238E27FC236}">
-                <a16:creationId xmlns="" xmlns:a16="http://schemas.microsoft.com/office/drawing/2014/main" id="{86149771-D78D-40D7-8B97-564358008D8D}"/>
+                <a16:creationId xmlns:a16="http://schemas.microsoft.com/office/drawing/2014/main" id="{86149771-D78D-40D7-8B97-564358008D8D}"/>
               </a:ext>
             </a:extLst>
           </p:cNvPr>
@@ -3233,7 +3188,7 @@
           <p:cNvPr id="11" name="텍스트 개체 틀 18">
             <a:extLst>
               <a:ext uri="{FF2B5EF4-FFF2-40B4-BE49-F238E27FC236}">
-                <a16:creationId xmlns="" xmlns:a16="http://schemas.microsoft.com/office/drawing/2014/main" id="{02AC410D-7805-4DA9-915F-991D726861C7}"/>
+                <a16:creationId xmlns:a16="http://schemas.microsoft.com/office/drawing/2014/main" id="{02AC410D-7805-4DA9-915F-991D726861C7}"/>
               </a:ext>
             </a:extLst>
           </p:cNvPr>
@@ -3320,7 +3275,7 @@
           <p:cNvPr id="12" name="제목 2">
             <a:extLst>
               <a:ext uri="{FF2B5EF4-FFF2-40B4-BE49-F238E27FC236}">
-                <a16:creationId xmlns="" xmlns:a16="http://schemas.microsoft.com/office/drawing/2014/main" id="{44AF0917-EEBC-44C5-8BA6-F1CA2AFA4B1E}"/>
+                <a16:creationId xmlns:a16="http://schemas.microsoft.com/office/drawing/2014/main" id="{44AF0917-EEBC-44C5-8BA6-F1CA2AFA4B1E}"/>
               </a:ext>
             </a:extLst>
           </p:cNvPr>
@@ -3395,10 +3350,6 @@
             <a:r>
               <a:rPr lang="ko-KR" altLang="en-US" dirty="0"/>
               <a:t> </a:t>
-            </a:r>
-            <a:r>
-              <a:rPr lang="en-US" altLang="ko-KR" dirty="0"/>
-              <a:t/>
             </a:r>
             <a:br>
               <a:rPr lang="en-US" altLang="ko-KR" dirty="0"/>
@@ -3476,7 +3427,7 @@
           <p:cNvPr id="12" name="직선 연결선 11">
             <a:extLst>
               <a:ext uri="{FF2B5EF4-FFF2-40B4-BE49-F238E27FC236}">
-                <a16:creationId xmlns="" xmlns:a16="http://schemas.microsoft.com/office/drawing/2014/main" id="{107951CE-0A5B-4EC7-B663-290867B6A3B2}"/>
+                <a16:creationId xmlns:a16="http://schemas.microsoft.com/office/drawing/2014/main" id="{107951CE-0A5B-4EC7-B663-290867B6A3B2}"/>
               </a:ext>
             </a:extLst>
           </p:cNvPr>
@@ -3519,7 +3470,7 @@
           <p:cNvPr id="13" name="슬라이드 번호 개체 틀 15">
             <a:extLst>
               <a:ext uri="{FF2B5EF4-FFF2-40B4-BE49-F238E27FC236}">
-                <a16:creationId xmlns="" xmlns:a16="http://schemas.microsoft.com/office/drawing/2014/main" id="{DB8B1220-1660-457F-B990-656A8230EA54}"/>
+                <a16:creationId xmlns:a16="http://schemas.microsoft.com/office/drawing/2014/main" id="{DB8B1220-1660-457F-B990-656A8230EA54}"/>
               </a:ext>
             </a:extLst>
           </p:cNvPr>
@@ -3686,7 +3637,7 @@
                 <a:tabLst/>
                 <a:defRPr/>
               </a:pPr>
-              <a:t>‹#›</a:t>
+              <a:t>‹Nº›</a:t>
             </a:fld>
             <a:endParaRPr lang="en-US" altLang="ko-KR" sz="900" dirty="0">
               <a:solidFill>
@@ -3706,7 +3657,7 @@
           <p:cNvPr id="14" name="직사각형 7">
             <a:extLst>
               <a:ext uri="{FF2B5EF4-FFF2-40B4-BE49-F238E27FC236}">
-                <a16:creationId xmlns="" xmlns:a16="http://schemas.microsoft.com/office/drawing/2014/main" id="{AA07D337-B9C3-4E5E-811E-AEFBB17ADEF5}"/>
+                <a16:creationId xmlns:a16="http://schemas.microsoft.com/office/drawing/2014/main" id="{AA07D337-B9C3-4E5E-811E-AEFBB17ADEF5}"/>
               </a:ext>
             </a:extLst>
           </p:cNvPr>
@@ -3777,7 +3728,7 @@
           <p:cNvPr id="7" name="직사각형 133">
             <a:extLst>
               <a:ext uri="{FF2B5EF4-FFF2-40B4-BE49-F238E27FC236}">
-                <a16:creationId xmlns="" xmlns:a16="http://schemas.microsoft.com/office/drawing/2014/main" id="{7A4BCBFF-5289-45FE-BA09-DFF42AF8A347}"/>
+                <a16:creationId xmlns:a16="http://schemas.microsoft.com/office/drawing/2014/main" id="{7A4BCBFF-5289-45FE-BA09-DFF42AF8A347}"/>
               </a:ext>
             </a:extLst>
           </p:cNvPr>
@@ -3830,7 +3781,7 @@
               <a:defRPr/>
             </a:pPr>
             <a:r>
-              <a:rPr lang="en-US" altLang="ko-KR" sz="2100" baseline="0" dirty="0" smtClean="0">
+              <a:rPr lang="en-US" altLang="ko-KR" sz="2100" baseline="0" dirty="0">
                 <a:solidFill>
                   <a:srgbClr val="1428A0"/>
                 </a:solidFill>
@@ -3841,7 +3792,7 @@
               <a:t>C&amp;P </a:t>
             </a:r>
             <a:r>
-              <a:rPr lang="en-US" altLang="ko-KR" sz="2100" dirty="0" smtClean="0">
+              <a:rPr lang="en-US" altLang="ko-KR" sz="2100" dirty="0">
                 <a:solidFill>
                   <a:srgbClr val="1428A0"/>
                 </a:solidFill>
@@ -3867,7 +3818,7 @@
           <p:cNvPr id="9" name="직사각형 8">
             <a:extLst>
               <a:ext uri="{FF2B5EF4-FFF2-40B4-BE49-F238E27FC236}">
-                <a16:creationId xmlns="" xmlns:a16="http://schemas.microsoft.com/office/drawing/2014/main" id="{4AA6CFBD-D9B3-4245-A68B-1D7EC1CB6F07}"/>
+                <a16:creationId xmlns:a16="http://schemas.microsoft.com/office/drawing/2014/main" id="{4AA6CFBD-D9B3-4245-A68B-1D7EC1CB6F07}"/>
               </a:ext>
             </a:extLst>
           </p:cNvPr>
@@ -3927,7 +3878,7 @@
           <p:cNvPr id="10" name="직사각형 9">
             <a:extLst>
               <a:ext uri="{FF2B5EF4-FFF2-40B4-BE49-F238E27FC236}">
-                <a16:creationId xmlns="" xmlns:a16="http://schemas.microsoft.com/office/drawing/2014/main" id="{1B2EB59A-603F-4715-ABA1-D9DF69D44512}"/>
+                <a16:creationId xmlns:a16="http://schemas.microsoft.com/office/drawing/2014/main" id="{1B2EB59A-603F-4715-ABA1-D9DF69D44512}"/>
               </a:ext>
             </a:extLst>
           </p:cNvPr>
@@ -3987,7 +3938,7 @@
           <p:cNvPr id="3" name="제목 2">
             <a:extLst>
               <a:ext uri="{FF2B5EF4-FFF2-40B4-BE49-F238E27FC236}">
-                <a16:creationId xmlns="" xmlns:a16="http://schemas.microsoft.com/office/drawing/2014/main" id="{CF6BC111-C555-4B09-8375-33C4F4C2FBB5}"/>
+                <a16:creationId xmlns:a16="http://schemas.microsoft.com/office/drawing/2014/main" id="{CF6BC111-C555-4B09-8375-33C4F4C2FBB5}"/>
               </a:ext>
             </a:extLst>
           </p:cNvPr>
@@ -4063,10 +4014,6 @@
               <a:rPr lang="ko-KR" altLang="en-US" dirty="0"/>
               <a:t> </a:t>
             </a:r>
-            <a:r>
-              <a:rPr lang="en-US" altLang="ko-KR" dirty="0"/>
-              <a:t/>
-            </a:r>
             <a:br>
               <a:rPr lang="en-US" altLang="ko-KR" dirty="0"/>
             </a:br>
@@ -4083,7 +4030,7 @@
           <p:cNvPr id="17" name="텍스트 개체 틀 18">
             <a:extLst>
               <a:ext uri="{FF2B5EF4-FFF2-40B4-BE49-F238E27FC236}">
-                <a16:creationId xmlns="" xmlns:a16="http://schemas.microsoft.com/office/drawing/2014/main" id="{CBEAE583-0BAA-455B-9555-B00A4FE8B1C9}"/>
+                <a16:creationId xmlns:a16="http://schemas.microsoft.com/office/drawing/2014/main" id="{CBEAE583-0BAA-455B-9555-B00A4FE8B1C9}"/>
               </a:ext>
             </a:extLst>
           </p:cNvPr>
@@ -4175,7 +4122,7 @@
   <p:clrMapOvr>
     <a:masterClrMapping/>
   </p:clrMapOvr>
-  <p:extLst mod="1">
+  <p:extLst>
     <p:ext uri="{DCECCB84-F9BA-43D5-87BE-67443E8EF086}">
       <p15:sldGuideLst xmlns:p15="http://schemas.microsoft.com/office/powerpoint/2012/main">
         <p15:guide id="1" orient="horz" pos="2614" userDrawn="1">
@@ -4256,7 +4203,7 @@
           <p:cNvPr id="12" name="직선 연결선 11">
             <a:extLst>
               <a:ext uri="{FF2B5EF4-FFF2-40B4-BE49-F238E27FC236}">
-                <a16:creationId xmlns="" xmlns:a16="http://schemas.microsoft.com/office/drawing/2014/main" id="{107951CE-0A5B-4EC7-B663-290867B6A3B2}"/>
+                <a16:creationId xmlns:a16="http://schemas.microsoft.com/office/drawing/2014/main" id="{107951CE-0A5B-4EC7-B663-290867B6A3B2}"/>
               </a:ext>
             </a:extLst>
           </p:cNvPr>
@@ -4299,7 +4246,7 @@
           <p:cNvPr id="13" name="슬라이드 번호 개체 틀 15">
             <a:extLst>
               <a:ext uri="{FF2B5EF4-FFF2-40B4-BE49-F238E27FC236}">
-                <a16:creationId xmlns="" xmlns:a16="http://schemas.microsoft.com/office/drawing/2014/main" id="{DB8B1220-1660-457F-B990-656A8230EA54}"/>
+                <a16:creationId xmlns:a16="http://schemas.microsoft.com/office/drawing/2014/main" id="{DB8B1220-1660-457F-B990-656A8230EA54}"/>
               </a:ext>
             </a:extLst>
           </p:cNvPr>
@@ -4466,7 +4413,7 @@
                 <a:tabLst/>
                 <a:defRPr/>
               </a:pPr>
-              <a:t>‹#›</a:t>
+              <a:t>‹Nº›</a:t>
             </a:fld>
             <a:endParaRPr lang="en-US" altLang="ko-KR" sz="900" dirty="0">
               <a:solidFill>
@@ -4486,7 +4433,7 @@
           <p:cNvPr id="14" name="직사각형 7">
             <a:extLst>
               <a:ext uri="{FF2B5EF4-FFF2-40B4-BE49-F238E27FC236}">
-                <a16:creationId xmlns="" xmlns:a16="http://schemas.microsoft.com/office/drawing/2014/main" id="{AA07D337-B9C3-4E5E-811E-AEFBB17ADEF5}"/>
+                <a16:creationId xmlns:a16="http://schemas.microsoft.com/office/drawing/2014/main" id="{AA07D337-B9C3-4E5E-811E-AEFBB17ADEF5}"/>
               </a:ext>
             </a:extLst>
           </p:cNvPr>
@@ -4557,7 +4504,7 @@
           <p:cNvPr id="3" name="제목 2">
             <a:extLst>
               <a:ext uri="{FF2B5EF4-FFF2-40B4-BE49-F238E27FC236}">
-                <a16:creationId xmlns="" xmlns:a16="http://schemas.microsoft.com/office/drawing/2014/main" id="{4625E1FE-2B04-4D8E-A51A-6B9CEC7B3790}"/>
+                <a16:creationId xmlns:a16="http://schemas.microsoft.com/office/drawing/2014/main" id="{4625E1FE-2B04-4D8E-A51A-6B9CEC7B3790}"/>
               </a:ext>
             </a:extLst>
           </p:cNvPr>
@@ -4644,7 +4591,7 @@
           <p:cNvPr id="19" name="텍스트 개체 틀 18">
             <a:extLst>
               <a:ext uri="{FF2B5EF4-FFF2-40B4-BE49-F238E27FC236}">
-                <a16:creationId xmlns="" xmlns:a16="http://schemas.microsoft.com/office/drawing/2014/main" id="{DFEC8C6A-D95C-4B3C-9803-6F9071BF0C29}"/>
+                <a16:creationId xmlns:a16="http://schemas.microsoft.com/office/drawing/2014/main" id="{DFEC8C6A-D95C-4B3C-9803-6F9071BF0C29}"/>
               </a:ext>
             </a:extLst>
           </p:cNvPr>
@@ -4729,7 +4676,7 @@
           <p:cNvPr id="20" name="텍스트 개체 틀 18">
             <a:extLst>
               <a:ext uri="{FF2B5EF4-FFF2-40B4-BE49-F238E27FC236}">
-                <a16:creationId xmlns="" xmlns:a16="http://schemas.microsoft.com/office/drawing/2014/main" id="{6DA22BCA-E7E2-4377-AD8E-AC1336C3DB31}"/>
+                <a16:creationId xmlns:a16="http://schemas.microsoft.com/office/drawing/2014/main" id="{6DA22BCA-E7E2-4377-AD8E-AC1336C3DB31}"/>
               </a:ext>
             </a:extLst>
           </p:cNvPr>
@@ -4814,7 +4761,7 @@
           <p:cNvPr id="21" name="텍스트 개체 틀 18">
             <a:extLst>
               <a:ext uri="{FF2B5EF4-FFF2-40B4-BE49-F238E27FC236}">
-                <a16:creationId xmlns="" xmlns:a16="http://schemas.microsoft.com/office/drawing/2014/main" id="{7647BD6A-5F13-45AE-859C-AF2BA0A739E6}"/>
+                <a16:creationId xmlns:a16="http://schemas.microsoft.com/office/drawing/2014/main" id="{7647BD6A-5F13-45AE-859C-AF2BA0A739E6}"/>
               </a:ext>
             </a:extLst>
           </p:cNvPr>
@@ -4874,7 +4821,7 @@
           <p:cNvPr id="23" name="텍스트 개체 틀 18">
             <a:extLst>
               <a:ext uri="{FF2B5EF4-FFF2-40B4-BE49-F238E27FC236}">
-                <a16:creationId xmlns="" xmlns:a16="http://schemas.microsoft.com/office/drawing/2014/main" id="{3A9667F7-80AD-4A7A-8543-285975B06BE3}"/>
+                <a16:creationId xmlns:a16="http://schemas.microsoft.com/office/drawing/2014/main" id="{3A9667F7-80AD-4A7A-8543-285975B06BE3}"/>
               </a:ext>
             </a:extLst>
           </p:cNvPr>
@@ -4961,7 +4908,7 @@
           <p:cNvPr id="16" name="텍스트 개체 틀 7">
             <a:extLst>
               <a:ext uri="{FF2B5EF4-FFF2-40B4-BE49-F238E27FC236}">
-                <a16:creationId xmlns="" xmlns:a16="http://schemas.microsoft.com/office/drawing/2014/main" id="{B6D584F0-F100-4FB4-B935-0E81DB1D3B51}"/>
+                <a16:creationId xmlns:a16="http://schemas.microsoft.com/office/drawing/2014/main" id="{B6D584F0-F100-4FB4-B935-0E81DB1D3B51}"/>
               </a:ext>
             </a:extLst>
           </p:cNvPr>
@@ -5075,7 +5022,7 @@
           <p:cNvPr id="17" name="슬라이드 번호 개체 틀 15">
             <a:extLst>
               <a:ext uri="{FF2B5EF4-FFF2-40B4-BE49-F238E27FC236}">
-                <a16:creationId xmlns="" xmlns:a16="http://schemas.microsoft.com/office/drawing/2014/main" id="{D63EAE99-E447-4D3D-BFEE-6F01BCEB93C6}"/>
+                <a16:creationId xmlns:a16="http://schemas.microsoft.com/office/drawing/2014/main" id="{D63EAE99-E447-4D3D-BFEE-6F01BCEB93C6}"/>
               </a:ext>
             </a:extLst>
           </p:cNvPr>
@@ -5308,7 +5255,7 @@
           <p:cNvPr id="12" name="직선 연결선 11">
             <a:extLst>
               <a:ext uri="{FF2B5EF4-FFF2-40B4-BE49-F238E27FC236}">
-                <a16:creationId xmlns="" xmlns:a16="http://schemas.microsoft.com/office/drawing/2014/main" id="{107951CE-0A5B-4EC7-B663-290867B6A3B2}"/>
+                <a16:creationId xmlns:a16="http://schemas.microsoft.com/office/drawing/2014/main" id="{107951CE-0A5B-4EC7-B663-290867B6A3B2}"/>
               </a:ext>
             </a:extLst>
           </p:cNvPr>
@@ -5351,7 +5298,7 @@
           <p:cNvPr id="13" name="슬라이드 번호 개체 틀 15">
             <a:extLst>
               <a:ext uri="{FF2B5EF4-FFF2-40B4-BE49-F238E27FC236}">
-                <a16:creationId xmlns="" xmlns:a16="http://schemas.microsoft.com/office/drawing/2014/main" id="{DB8B1220-1660-457F-B990-656A8230EA54}"/>
+                <a16:creationId xmlns:a16="http://schemas.microsoft.com/office/drawing/2014/main" id="{DB8B1220-1660-457F-B990-656A8230EA54}"/>
               </a:ext>
             </a:extLst>
           </p:cNvPr>
@@ -5518,7 +5465,7 @@
                 <a:tabLst/>
                 <a:defRPr/>
               </a:pPr>
-              <a:t>‹#›</a:t>
+              <a:t>‹Nº›</a:t>
             </a:fld>
             <a:endParaRPr lang="en-US" altLang="ko-KR" sz="900" dirty="0">
               <a:solidFill>
@@ -5538,7 +5485,7 @@
           <p:cNvPr id="14" name="직사각형 7">
             <a:extLst>
               <a:ext uri="{FF2B5EF4-FFF2-40B4-BE49-F238E27FC236}">
-                <a16:creationId xmlns="" xmlns:a16="http://schemas.microsoft.com/office/drawing/2014/main" id="{AA07D337-B9C3-4E5E-811E-AEFBB17ADEF5}"/>
+                <a16:creationId xmlns:a16="http://schemas.microsoft.com/office/drawing/2014/main" id="{AA07D337-B9C3-4E5E-811E-AEFBB17ADEF5}"/>
               </a:ext>
             </a:extLst>
           </p:cNvPr>
@@ -5609,7 +5556,7 @@
           <p:cNvPr id="17" name="슬라이드 번호 개체 틀 15">
             <a:extLst>
               <a:ext uri="{FF2B5EF4-FFF2-40B4-BE49-F238E27FC236}">
-                <a16:creationId xmlns="" xmlns:a16="http://schemas.microsoft.com/office/drawing/2014/main" id="{D63EAE99-E447-4D3D-BFEE-6F01BCEB93C6}"/>
+                <a16:creationId xmlns:a16="http://schemas.microsoft.com/office/drawing/2014/main" id="{D63EAE99-E447-4D3D-BFEE-6F01BCEB93C6}"/>
               </a:ext>
             </a:extLst>
           </p:cNvPr>
@@ -5842,7 +5789,7 @@
           <p:cNvPr id="12" name="직선 연결선 11">
             <a:extLst>
               <a:ext uri="{FF2B5EF4-FFF2-40B4-BE49-F238E27FC236}">
-                <a16:creationId xmlns="" xmlns:a16="http://schemas.microsoft.com/office/drawing/2014/main" id="{107951CE-0A5B-4EC7-B663-290867B6A3B2}"/>
+                <a16:creationId xmlns:a16="http://schemas.microsoft.com/office/drawing/2014/main" id="{107951CE-0A5B-4EC7-B663-290867B6A3B2}"/>
               </a:ext>
             </a:extLst>
           </p:cNvPr>
@@ -5885,7 +5832,7 @@
           <p:cNvPr id="13" name="슬라이드 번호 개체 틀 15">
             <a:extLst>
               <a:ext uri="{FF2B5EF4-FFF2-40B4-BE49-F238E27FC236}">
-                <a16:creationId xmlns="" xmlns:a16="http://schemas.microsoft.com/office/drawing/2014/main" id="{DB8B1220-1660-457F-B990-656A8230EA54}"/>
+                <a16:creationId xmlns:a16="http://schemas.microsoft.com/office/drawing/2014/main" id="{DB8B1220-1660-457F-B990-656A8230EA54}"/>
               </a:ext>
             </a:extLst>
           </p:cNvPr>
@@ -6052,7 +5999,7 @@
                 <a:tabLst/>
                 <a:defRPr/>
               </a:pPr>
-              <a:t>‹#›</a:t>
+              <a:t>‹Nº›</a:t>
             </a:fld>
             <a:endParaRPr lang="en-US" altLang="ko-KR" sz="900" dirty="0">
               <a:solidFill>
@@ -6072,7 +6019,7 @@
           <p:cNvPr id="14" name="직사각형 7">
             <a:extLst>
               <a:ext uri="{FF2B5EF4-FFF2-40B4-BE49-F238E27FC236}">
-                <a16:creationId xmlns="" xmlns:a16="http://schemas.microsoft.com/office/drawing/2014/main" id="{AA07D337-B9C3-4E5E-811E-AEFBB17ADEF5}"/>
+                <a16:creationId xmlns:a16="http://schemas.microsoft.com/office/drawing/2014/main" id="{AA07D337-B9C3-4E5E-811E-AEFBB17ADEF5}"/>
               </a:ext>
             </a:extLst>
           </p:cNvPr>
@@ -6229,7 +6176,7 @@
           <p:cNvPr id="12" name="직선 연결선 11">
             <a:extLst>
               <a:ext uri="{FF2B5EF4-FFF2-40B4-BE49-F238E27FC236}">
-                <a16:creationId xmlns="" xmlns:a16="http://schemas.microsoft.com/office/drawing/2014/main" id="{107951CE-0A5B-4EC7-B663-290867B6A3B2}"/>
+                <a16:creationId xmlns:a16="http://schemas.microsoft.com/office/drawing/2014/main" id="{107951CE-0A5B-4EC7-B663-290867B6A3B2}"/>
               </a:ext>
             </a:extLst>
           </p:cNvPr>
@@ -6272,7 +6219,7 @@
           <p:cNvPr id="13" name="슬라이드 번호 개체 틀 15">
             <a:extLst>
               <a:ext uri="{FF2B5EF4-FFF2-40B4-BE49-F238E27FC236}">
-                <a16:creationId xmlns="" xmlns:a16="http://schemas.microsoft.com/office/drawing/2014/main" id="{DB8B1220-1660-457F-B990-656A8230EA54}"/>
+                <a16:creationId xmlns:a16="http://schemas.microsoft.com/office/drawing/2014/main" id="{DB8B1220-1660-457F-B990-656A8230EA54}"/>
               </a:ext>
             </a:extLst>
           </p:cNvPr>
@@ -6439,7 +6386,7 @@
                 <a:tabLst/>
                 <a:defRPr/>
               </a:pPr>
-              <a:t>‹#›</a:t>
+              <a:t>‹Nº›</a:t>
             </a:fld>
             <a:endParaRPr lang="en-US" altLang="ko-KR" sz="900" dirty="0">
               <a:solidFill>
@@ -6459,7 +6406,7 @@
           <p:cNvPr id="14" name="직사각형 7">
             <a:extLst>
               <a:ext uri="{FF2B5EF4-FFF2-40B4-BE49-F238E27FC236}">
-                <a16:creationId xmlns="" xmlns:a16="http://schemas.microsoft.com/office/drawing/2014/main" id="{AA07D337-B9C3-4E5E-811E-AEFBB17ADEF5}"/>
+                <a16:creationId xmlns:a16="http://schemas.microsoft.com/office/drawing/2014/main" id="{AA07D337-B9C3-4E5E-811E-AEFBB17ADEF5}"/>
               </a:ext>
             </a:extLst>
           </p:cNvPr>
@@ -6530,7 +6477,7 @@
           <p:cNvPr id="7" name="슬라이드 번호 개체 틀 15">
             <a:extLst>
               <a:ext uri="{FF2B5EF4-FFF2-40B4-BE49-F238E27FC236}">
-                <a16:creationId xmlns="" xmlns:a16="http://schemas.microsoft.com/office/drawing/2014/main" id="{E75758B0-2429-4331-898E-5EEED60D4280}"/>
+                <a16:creationId xmlns:a16="http://schemas.microsoft.com/office/drawing/2014/main" id="{E75758B0-2429-4331-898E-5EEED60D4280}"/>
               </a:ext>
             </a:extLst>
           </p:cNvPr>
@@ -6728,7 +6675,7 @@
           <p:cNvPr id="10" name="직선 연결선 9">
             <a:extLst>
               <a:ext uri="{FF2B5EF4-FFF2-40B4-BE49-F238E27FC236}">
-                <a16:creationId xmlns="" xmlns:a16="http://schemas.microsoft.com/office/drawing/2014/main" id="{107951CE-0A5B-4EC7-B663-290867B6A3B2}"/>
+                <a16:creationId xmlns:a16="http://schemas.microsoft.com/office/drawing/2014/main" id="{107951CE-0A5B-4EC7-B663-290867B6A3B2}"/>
               </a:ext>
             </a:extLst>
           </p:cNvPr>
@@ -6771,7 +6718,7 @@
           <p:cNvPr id="16" name="슬라이드 번호 개체 틀 15">
             <a:extLst>
               <a:ext uri="{FF2B5EF4-FFF2-40B4-BE49-F238E27FC236}">
-                <a16:creationId xmlns="" xmlns:a16="http://schemas.microsoft.com/office/drawing/2014/main" id="{DB8B1220-1660-457F-B990-656A8230EA54}"/>
+                <a16:creationId xmlns:a16="http://schemas.microsoft.com/office/drawing/2014/main" id="{DB8B1220-1660-457F-B990-656A8230EA54}"/>
               </a:ext>
             </a:extLst>
           </p:cNvPr>
@@ -6938,7 +6885,7 @@
                 <a:tabLst/>
                 <a:defRPr/>
               </a:pPr>
-              <a:t>‹#›</a:t>
+              <a:t>‹Nº›</a:t>
             </a:fld>
             <a:endParaRPr lang="en-US" altLang="ko-KR" sz="900" dirty="0">
               <a:solidFill>
@@ -6958,7 +6905,7 @@
           <p:cNvPr id="18" name="직사각형 7">
             <a:extLst>
               <a:ext uri="{FF2B5EF4-FFF2-40B4-BE49-F238E27FC236}">
-                <a16:creationId xmlns="" xmlns:a16="http://schemas.microsoft.com/office/drawing/2014/main" id="{AA07D337-B9C3-4E5E-811E-AEFBB17ADEF5}"/>
+                <a16:creationId xmlns:a16="http://schemas.microsoft.com/office/drawing/2014/main" id="{AA07D337-B9C3-4E5E-811E-AEFBB17ADEF5}"/>
               </a:ext>
             </a:extLst>
           </p:cNvPr>
@@ -7064,7 +7011,7 @@
           <p:cNvPr id="9" name="슬라이드 번호 개체 틀 15">
             <a:extLst>
               <a:ext uri="{FF2B5EF4-FFF2-40B4-BE49-F238E27FC236}">
-                <a16:creationId xmlns="" xmlns:a16="http://schemas.microsoft.com/office/drawing/2014/main" id="{C5960DC7-D671-485D-92B0-FEED6CE658A3}"/>
+                <a16:creationId xmlns:a16="http://schemas.microsoft.com/office/drawing/2014/main" id="{C5960DC7-D671-485D-92B0-FEED6CE658A3}"/>
               </a:ext>
             </a:extLst>
           </p:cNvPr>
@@ -7262,7 +7209,7 @@
           <p:cNvPr id="6" name="그림 2">
             <a:extLst>
               <a:ext uri="{FF2B5EF4-FFF2-40B4-BE49-F238E27FC236}">
-                <a16:creationId xmlns="" xmlns:a16="http://schemas.microsoft.com/office/drawing/2014/main" id="{C441AFAB-5BBF-465C-B7A8-FED86E626178}"/>
+                <a16:creationId xmlns:a16="http://schemas.microsoft.com/office/drawing/2014/main" id="{C441AFAB-5BBF-465C-B7A8-FED86E626178}"/>
               </a:ext>
             </a:extLst>
           </p:cNvPr>
@@ -7346,7 +7293,7 @@
           <p:cNvPr id="7" name="직사각형 6">
             <a:extLst>
               <a:ext uri="{FF2B5EF4-FFF2-40B4-BE49-F238E27FC236}">
-                <a16:creationId xmlns="" xmlns:a16="http://schemas.microsoft.com/office/drawing/2014/main" id="{782B242C-8600-47F0-98D5-6EA512C41BF2}"/>
+                <a16:creationId xmlns:a16="http://schemas.microsoft.com/office/drawing/2014/main" id="{782B242C-8600-47F0-98D5-6EA512C41BF2}"/>
               </a:ext>
             </a:extLst>
           </p:cNvPr>
@@ -7430,7 +7377,7 @@
               <a:t>ⓒ</a:t>
             </a:r>
             <a:r>
-              <a:rPr kumimoji="0" lang="en-US" altLang="ko-KR" sz="1000" b="0" i="0" u="none" strike="noStrike" kern="1200" cap="none" spc="0" normalizeH="0" baseline="0" noProof="0" dirty="0" smtClean="0">
+              <a:rPr kumimoji="0" lang="en-US" altLang="ko-KR" sz="1000" b="0" i="0" u="none" strike="noStrike" kern="1200" cap="none" spc="0" normalizeH="0" baseline="0" noProof="0" dirty="0">
                 <a:ln>
                   <a:noFill/>
                 </a:ln>
@@ -7444,24 +7391,7 @@
                 <a:ea typeface="SamsungOne 400C" panose="020B0506030303020204" pitchFamily="34" charset="0"/>
                 <a:cs typeface="+mn-cs"/>
               </a:rPr>
-              <a:t>2023 </a:t>
-            </a:r>
-            <a:r>
-              <a:rPr kumimoji="0" lang="en-US" altLang="ko-KR" sz="1000" b="0" i="0" u="none" strike="noStrike" kern="1200" cap="none" spc="0" normalizeH="0" baseline="0" noProof="0" dirty="0">
-                <a:ln>
-                  <a:noFill/>
-                </a:ln>
-                <a:solidFill>
-                  <a:prstClr val="white"/>
-                </a:solidFill>
-                <a:effectLst/>
-                <a:uLnTx/>
-                <a:uFillTx/>
-                <a:latin typeface="SamsungOne 400C" panose="020B0506030303020204" pitchFamily="34" charset="0"/>
-                <a:ea typeface="SamsungOne 400C" panose="020B0506030303020204" pitchFamily="34" charset="0"/>
-                <a:cs typeface="+mn-cs"/>
-              </a:rPr>
-              <a:t>SAMSUNG. All rights reserved.</a:t>
+              <a:t>2023 SAMSUNG. All rights reserved.</a:t>
             </a:r>
           </a:p>
           <a:p>
@@ -7569,41 +7499,7 @@
                 <a:ea typeface="SamsungOne 400C" panose="020B0506030303020204" pitchFamily="34" charset="0"/>
                 <a:cs typeface="+mn-cs"/>
               </a:rPr>
-              <a:t>To use this book other than the curriculum of Samsung </a:t>
-            </a:r>
-            <a:r>
-              <a:rPr kumimoji="0" lang="en-US" altLang="ko-KR" sz="1000" b="0" i="0" u="none" strike="noStrike" kern="1200" cap="none" spc="0" normalizeH="0" baseline="0" noProof="0" dirty="0" smtClean="0">
-                <a:ln>
-                  <a:noFill/>
-                </a:ln>
-                <a:solidFill>
-                  <a:prstClr val="white"/>
-                </a:solidFill>
-                <a:effectLst/>
-                <a:uLnTx/>
-                <a:uFillTx/>
-                <a:latin typeface="SamsungOne 400C" panose="020B0506030303020204" pitchFamily="34" charset="0"/>
-                <a:ea typeface="SamsungOne 400C" panose="020B0506030303020204" pitchFamily="34" charset="0"/>
-                <a:cs typeface="+mn-cs"/>
-              </a:rPr>
-              <a:t>Innovation </a:t>
-            </a:r>
-            <a:r>
-              <a:rPr kumimoji="0" lang="en-US" altLang="ko-KR" sz="1000" b="0" i="0" u="none" strike="noStrike" kern="1200" cap="none" spc="0" normalizeH="0" baseline="0" noProof="0" dirty="0">
-                <a:ln>
-                  <a:noFill/>
-                </a:ln>
-                <a:solidFill>
-                  <a:prstClr val="white"/>
-                </a:solidFill>
-                <a:effectLst/>
-                <a:uLnTx/>
-                <a:uFillTx/>
-                <a:latin typeface="SamsungOne 400C" panose="020B0506030303020204" pitchFamily="34" charset="0"/>
-                <a:ea typeface="SamsungOne 400C" panose="020B0506030303020204" pitchFamily="34" charset="0"/>
-                <a:cs typeface="+mn-cs"/>
-              </a:rPr>
-              <a:t>Campus or to use the entire or part of this book, you must receive written consent from copyright holder.</a:t>
+              <a:t>To use this book other than the curriculum of Samsung Innovation Campus or to use the entire or part of this book, you must receive written consent from copyright holder.</a:t>
             </a:r>
           </a:p>
         </p:txBody>
@@ -7613,7 +7509,7 @@
           <p:cNvPr id="10" name="그림 3">
             <a:extLst>
               <a:ext uri="{FF2B5EF4-FFF2-40B4-BE49-F238E27FC236}">
-                <a16:creationId xmlns="" xmlns:a16="http://schemas.microsoft.com/office/drawing/2014/main" id="{A977D3D7-ABF1-4BDD-B1E5-CCA79CC8184C}"/>
+                <a16:creationId xmlns:a16="http://schemas.microsoft.com/office/drawing/2014/main" id="{A977D3D7-ABF1-4BDD-B1E5-CCA79CC8184C}"/>
               </a:ext>
             </a:extLst>
           </p:cNvPr>
@@ -7649,7 +7545,7 @@
           <p:cNvPr id="9" name="Freeform 5">
             <a:extLst>
               <a:ext uri="{FF2B5EF4-FFF2-40B4-BE49-F238E27FC236}">
-                <a16:creationId xmlns="" xmlns:a16="http://schemas.microsoft.com/office/drawing/2014/main" id="{0D8AEED9-5E8F-4A4F-8427-AE314BEC60F8}"/>
+                <a16:creationId xmlns:a16="http://schemas.microsoft.com/office/drawing/2014/main" id="{0D8AEED9-5E8F-4A4F-8427-AE314BEC60F8}"/>
               </a:ext>
             </a:extLst>
           </p:cNvPr>
@@ -8935,7 +8831,7 @@
           <p:cNvPr id="5" name="텍스트 개체 틀 4">
             <a:extLst>
               <a:ext uri="{FF2B5EF4-FFF2-40B4-BE49-F238E27FC236}">
-                <a16:creationId xmlns="" xmlns:a16="http://schemas.microsoft.com/office/drawing/2014/main" id="{9ABA57D5-7920-4C59-8990-1FDF22441FA6}"/>
+                <a16:creationId xmlns:a16="http://schemas.microsoft.com/office/drawing/2014/main" id="{9ABA57D5-7920-4C59-8990-1FDF22441FA6}"/>
               </a:ext>
             </a:extLst>
           </p:cNvPr>
@@ -8946,16 +8842,21 @@
             <p:ph type="body" sz="quarter" idx="11"/>
           </p:nvPr>
         </p:nvSpPr>
-        <p:spPr/>
+        <p:spPr>
+          <a:xfrm>
+            <a:off x="720000" y="3429000"/>
+            <a:ext cx="6837808" cy="276999"/>
+          </a:xfrm>
+        </p:spPr>
         <p:txBody>
           <a:bodyPr/>
           <a:lstStyle/>
           <a:p>
             <a:r>
-              <a:rPr lang="en-US" altLang="ko-KR" dirty="0"/>
+              <a:rPr lang="en-US" altLang="ko-KR"/>
               <a:t>Team Name</a:t>
             </a:r>
-            <a:endParaRPr lang="ko-KR" altLang="en-US" dirty="0"/>
+            <a:endParaRPr lang="en-US" altLang="ko-KR" dirty="0"/>
           </a:p>
         </p:txBody>
       </p:sp>
@@ -8964,7 +8865,7 @@
           <p:cNvPr id="4" name="제목 3">
             <a:extLst>
               <a:ext uri="{FF2B5EF4-FFF2-40B4-BE49-F238E27FC236}">
-                <a16:creationId xmlns="" xmlns:a16="http://schemas.microsoft.com/office/drawing/2014/main" id="{51786819-9BFB-478D-BAE7-57DB1DEACF78}"/>
+                <a16:creationId xmlns:a16="http://schemas.microsoft.com/office/drawing/2014/main" id="{51786819-9BFB-478D-BAE7-57DB1DEACF78}"/>
               </a:ext>
             </a:extLst>
           </p:cNvPr>
@@ -8978,7 +8879,7 @@
         <p:spPr>
           <a:xfrm>
             <a:off x="720000" y="1710000"/>
-            <a:ext cx="5221019" cy="1477328"/>
+            <a:ext cx="7261950" cy="1477328"/>
           </a:xfrm>
         </p:spPr>
         <p:txBody>
@@ -8987,16 +8888,240 @@
           <a:p>
             <a:r>
               <a:rPr lang="en-US" altLang="ko-KR" dirty="0"/>
-              <a:t>Project</a:t>
+              <a:t>Project Name</a:t>
             </a:r>
             <a:br>
               <a:rPr lang="en-US" altLang="ko-KR" dirty="0"/>
             </a:br>
             <a:r>
+              <a:rPr lang="en-US" altLang="ko-KR" dirty="0" err="1"/>
+              <a:t>Estadios</a:t>
+            </a:r>
+            <a:r>
               <a:rPr lang="en-US" altLang="ko-KR" dirty="0"/>
-              <a:t>Name</a:t>
+              <a:t> y </a:t>
+            </a:r>
+            <a:r>
+              <a:rPr lang="en-US" altLang="ko-KR" dirty="0" err="1"/>
+              <a:t>fanaticos</a:t>
             </a:r>
             <a:endParaRPr lang="ko-KR" altLang="en-US" dirty="0"/>
+          </a:p>
+        </p:txBody>
+      </p:sp>
+      <p:sp>
+        <p:nvSpPr>
+          <p:cNvPr id="2" name="텍스트 개체 틀 4">
+            <a:extLst>
+              <a:ext uri="{FF2B5EF4-FFF2-40B4-BE49-F238E27FC236}">
+                <a16:creationId xmlns:a16="http://schemas.microsoft.com/office/drawing/2014/main" id="{DB7DEF84-1B3A-8843-98A9-028127A200B2}"/>
+              </a:ext>
+            </a:extLst>
+          </p:cNvPr>
+          <p:cNvSpPr txBox="1">
+            <a:spLocks/>
+          </p:cNvSpPr>
+          <p:nvPr/>
+        </p:nvSpPr>
+        <p:spPr>
+          <a:xfrm>
+            <a:off x="4263300" y="5148000"/>
+            <a:ext cx="3475412" cy="276999"/>
+          </a:xfrm>
+          <a:prstGeom prst="rect">
+            <a:avLst/>
+          </a:prstGeom>
+          <a:noFill/>
+          <a:ln w="12700" cap="flat" cmpd="sng" algn="ctr">
+            <a:noFill/>
+            <a:prstDash val="solid"/>
+            <a:miter lim="800000"/>
+          </a:ln>
+          <a:effectLst/>
+        </p:spPr>
+        <p:txBody>
+          <a:bodyPr wrap="square" lIns="0" tIns="0" rIns="0" bIns="0" rtlCol="0" anchor="t">
+            <a:spAutoFit/>
+            <a:scene3d>
+              <a:camera prst="orthographicFront"/>
+              <a:lightRig rig="threePt" dir="t"/>
+            </a:scene3d>
+            <a:sp3d>
+              <a:bevelT w="0" h="6350"/>
+            </a:sp3d>
+          </a:bodyPr>
+          <a:lstStyle>
+            <a:lvl1pPr marL="0" indent="0" algn="l" defTabSz="914126" rtl="0" eaLnBrk="1" latinLnBrk="1" hangingPunct="1">
+              <a:lnSpc>
+                <a:spcPct val="100000"/>
+              </a:lnSpc>
+              <a:spcBef>
+                <a:spcPts val="0"/>
+              </a:spcBef>
+              <a:buFont typeface="Arial" panose="020B0604020202020204" pitchFamily="34" charset="0"/>
+              <a:buNone/>
+              <a:defRPr lang="ko-KR" altLang="en-US" sz="1800" kern="1200" dirty="0">
+                <a:solidFill>
+                  <a:schemeClr val="bg1">
+                    <a:lumMod val="50000"/>
+                  </a:schemeClr>
+                </a:solidFill>
+                <a:latin typeface="Samsung Sharp Sans" pitchFamily="2" charset="0"/>
+                <a:ea typeface="Samsung Sharp Sans" pitchFamily="2" charset="0"/>
+                <a:cs typeface="Samsung Sharp Sans" pitchFamily="2" charset="0"/>
+              </a:defRPr>
+            </a:lvl1pPr>
+            <a:lvl2pPr marL="685594" indent="-228531" algn="l" defTabSz="914126" rtl="0" eaLnBrk="1" latinLnBrk="1" hangingPunct="1">
+              <a:lnSpc>
+                <a:spcPct val="90000"/>
+              </a:lnSpc>
+              <a:spcBef>
+                <a:spcPts val="500"/>
+              </a:spcBef>
+              <a:buFont typeface="Arial" panose="020B0604020202020204" pitchFamily="34" charset="0"/>
+              <a:buChar char="•"/>
+              <a:defRPr sz="2399" kern="1200">
+                <a:solidFill>
+                  <a:schemeClr val="lt1"/>
+                </a:solidFill>
+                <a:latin typeface="+mn-lt"/>
+                <a:ea typeface="+mn-ea"/>
+                <a:cs typeface="+mn-cs"/>
+              </a:defRPr>
+            </a:lvl2pPr>
+            <a:lvl3pPr marL="1142657" indent="-228531" algn="l" defTabSz="914126" rtl="0" eaLnBrk="1" latinLnBrk="1" hangingPunct="1">
+              <a:lnSpc>
+                <a:spcPct val="90000"/>
+              </a:lnSpc>
+              <a:spcBef>
+                <a:spcPts val="500"/>
+              </a:spcBef>
+              <a:buFont typeface="Arial" panose="020B0604020202020204" pitchFamily="34" charset="0"/>
+              <a:buChar char="•"/>
+              <a:defRPr sz="1999" kern="1200">
+                <a:solidFill>
+                  <a:schemeClr val="lt1"/>
+                </a:solidFill>
+                <a:latin typeface="+mn-lt"/>
+                <a:ea typeface="+mn-ea"/>
+                <a:cs typeface="+mn-cs"/>
+              </a:defRPr>
+            </a:lvl3pPr>
+            <a:lvl4pPr marL="1599720" indent="-228531" algn="l" defTabSz="914126" rtl="0" eaLnBrk="1" latinLnBrk="1" hangingPunct="1">
+              <a:lnSpc>
+                <a:spcPct val="90000"/>
+              </a:lnSpc>
+              <a:spcBef>
+                <a:spcPts val="500"/>
+              </a:spcBef>
+              <a:buFont typeface="Arial" panose="020B0604020202020204" pitchFamily="34" charset="0"/>
+              <a:buChar char="•"/>
+              <a:defRPr sz="1799" kern="1200">
+                <a:solidFill>
+                  <a:schemeClr val="lt1"/>
+                </a:solidFill>
+                <a:latin typeface="+mn-lt"/>
+                <a:ea typeface="+mn-ea"/>
+                <a:cs typeface="+mn-cs"/>
+              </a:defRPr>
+            </a:lvl4pPr>
+            <a:lvl5pPr marL="2056783" indent="-228531" algn="l" defTabSz="914126" rtl="0" eaLnBrk="1" latinLnBrk="1" hangingPunct="1">
+              <a:lnSpc>
+                <a:spcPct val="90000"/>
+              </a:lnSpc>
+              <a:spcBef>
+                <a:spcPts val="500"/>
+              </a:spcBef>
+              <a:buFont typeface="Arial" panose="020B0604020202020204" pitchFamily="34" charset="0"/>
+              <a:buChar char="•"/>
+              <a:defRPr sz="1799" kern="1200">
+                <a:solidFill>
+                  <a:schemeClr val="lt1"/>
+                </a:solidFill>
+                <a:latin typeface="+mn-lt"/>
+                <a:ea typeface="+mn-ea"/>
+                <a:cs typeface="+mn-cs"/>
+              </a:defRPr>
+            </a:lvl5pPr>
+            <a:lvl6pPr marL="2513846" indent="-228531" algn="l" defTabSz="914126" rtl="0" eaLnBrk="1" latinLnBrk="1" hangingPunct="1">
+              <a:lnSpc>
+                <a:spcPct val="90000"/>
+              </a:lnSpc>
+              <a:spcBef>
+                <a:spcPts val="500"/>
+              </a:spcBef>
+              <a:buFont typeface="Arial" panose="020B0604020202020204" pitchFamily="34" charset="0"/>
+              <a:buChar char="•"/>
+              <a:defRPr sz="1799" kern="1200">
+                <a:solidFill>
+                  <a:schemeClr val="lt1"/>
+                </a:solidFill>
+                <a:latin typeface="+mn-lt"/>
+                <a:ea typeface="+mn-ea"/>
+                <a:cs typeface="+mn-cs"/>
+              </a:defRPr>
+            </a:lvl6pPr>
+            <a:lvl7pPr marL="2970908" indent="-228531" algn="l" defTabSz="914126" rtl="0" eaLnBrk="1" latinLnBrk="1" hangingPunct="1">
+              <a:lnSpc>
+                <a:spcPct val="90000"/>
+              </a:lnSpc>
+              <a:spcBef>
+                <a:spcPts val="500"/>
+              </a:spcBef>
+              <a:buFont typeface="Arial" panose="020B0604020202020204" pitchFamily="34" charset="0"/>
+              <a:buChar char="•"/>
+              <a:defRPr sz="1799" kern="1200">
+                <a:solidFill>
+                  <a:schemeClr val="lt1"/>
+                </a:solidFill>
+                <a:latin typeface="+mn-lt"/>
+                <a:ea typeface="+mn-ea"/>
+                <a:cs typeface="+mn-cs"/>
+              </a:defRPr>
+            </a:lvl7pPr>
+            <a:lvl8pPr marL="3427971" indent="-228531" algn="l" defTabSz="914126" rtl="0" eaLnBrk="1" latinLnBrk="1" hangingPunct="1">
+              <a:lnSpc>
+                <a:spcPct val="90000"/>
+              </a:lnSpc>
+              <a:spcBef>
+                <a:spcPts val="500"/>
+              </a:spcBef>
+              <a:buFont typeface="Arial" panose="020B0604020202020204" pitchFamily="34" charset="0"/>
+              <a:buChar char="•"/>
+              <a:defRPr sz="1799" kern="1200">
+                <a:solidFill>
+                  <a:schemeClr val="lt1"/>
+                </a:solidFill>
+                <a:latin typeface="+mn-lt"/>
+                <a:ea typeface="+mn-ea"/>
+                <a:cs typeface="+mn-cs"/>
+              </a:defRPr>
+            </a:lvl8pPr>
+            <a:lvl9pPr marL="3885034" indent="-228531" algn="l" defTabSz="914126" rtl="0" eaLnBrk="1" latinLnBrk="1" hangingPunct="1">
+              <a:lnSpc>
+                <a:spcPct val="90000"/>
+              </a:lnSpc>
+              <a:spcBef>
+                <a:spcPts val="500"/>
+              </a:spcBef>
+              <a:buFont typeface="Arial" panose="020B0604020202020204" pitchFamily="34" charset="0"/>
+              <a:buChar char="•"/>
+              <a:defRPr sz="1799" kern="1200">
+                <a:solidFill>
+                  <a:schemeClr val="lt1"/>
+                </a:solidFill>
+                <a:latin typeface="+mn-lt"/>
+                <a:ea typeface="+mn-ea"/>
+                <a:cs typeface="+mn-cs"/>
+              </a:defRPr>
+            </a:lvl9pPr>
+          </a:lstStyle>
+          <a:p>
+            <a:r>
+              <a:rPr lang="es-ES" altLang="ko-KR" dirty="0"/>
+              <a:t>Lunes 28 de octubre de 2024</a:t>
+            </a:r>
+            <a:endParaRPr lang="es-ES" dirty="0"/>
           </a:p>
         </p:txBody>
       </p:sp>
@@ -9035,7 +9160,7 @@
           <p:cNvPr id="4" name="Group 1">
             <a:extLst>
               <a:ext uri="{FF2B5EF4-FFF2-40B4-BE49-F238E27FC236}">
-                <a16:creationId xmlns="" xmlns:a16="http://schemas.microsoft.com/office/drawing/2014/main" id="{1E42F3CA-E8F5-41D4-A677-F15543C46B01}"/>
+                <a16:creationId xmlns:a16="http://schemas.microsoft.com/office/drawing/2014/main" id="{1E42F3CA-E8F5-41D4-A677-F15543C46B01}"/>
               </a:ext>
             </a:extLst>
           </p:cNvPr>
@@ -9055,7 +9180,7 @@
             <p:cNvPr id="5" name="직사각형 4">
               <a:extLst>
                 <a:ext uri="{FF2B5EF4-FFF2-40B4-BE49-F238E27FC236}">
-                  <a16:creationId xmlns="" xmlns:a16="http://schemas.microsoft.com/office/drawing/2014/main" id="{EEA224A4-F527-4CB0-B62E-359CBCD4E781}"/>
+                  <a16:creationId xmlns:a16="http://schemas.microsoft.com/office/drawing/2014/main" id="{EEA224A4-F527-4CB0-B62E-359CBCD4E781}"/>
                 </a:ext>
               </a:extLst>
             </p:cNvPr>
@@ -9110,19 +9235,6 @@
                 </a:spcAft>
               </a:pPr>
               <a:r>
-                <a:rPr lang="en-US" altLang="ko-KR" dirty="0" smtClean="0">
-                  <a:solidFill>
-                    <a:schemeClr val="tx1">
-                      <a:lumMod val="75000"/>
-                      <a:lumOff val="25000"/>
-                    </a:schemeClr>
-                  </a:solidFill>
-                  <a:latin typeface="SamsungOne 700" panose="020B0803030303020204" pitchFamily="34" charset="0"/>
-                  <a:ea typeface="SamsungOne 700" panose="020B0803030303020204" pitchFamily="34" charset="0"/>
-                </a:rPr>
-                <a:t>Unit </a:t>
-              </a:r>
-              <a:r>
                 <a:rPr lang="en-US" altLang="ko-KR" dirty="0">
                   <a:solidFill>
                     <a:schemeClr val="tx1">
@@ -9133,7 +9245,7 @@
                   <a:latin typeface="SamsungOne 700" panose="020B0803030303020204" pitchFamily="34" charset="0"/>
                   <a:ea typeface="SamsungOne 700" panose="020B0803030303020204" pitchFamily="34" charset="0"/>
                 </a:rPr>
-                <a:t>1. Title</a:t>
+                <a:t>Unit 1. Title</a:t>
               </a:r>
             </a:p>
           </p:txBody>
@@ -9143,7 +9255,7 @@
             <p:cNvPr id="6" name="직사각형 5">
               <a:extLst>
                 <a:ext uri="{FF2B5EF4-FFF2-40B4-BE49-F238E27FC236}">
-                  <a16:creationId xmlns="" xmlns:a16="http://schemas.microsoft.com/office/drawing/2014/main" id="{F55CBCEC-393B-4E62-A937-E41B3CD7A93E}"/>
+                  <a16:creationId xmlns:a16="http://schemas.microsoft.com/office/drawing/2014/main" id="{F55CBCEC-393B-4E62-A937-E41B3CD7A93E}"/>
                 </a:ext>
               </a:extLst>
             </p:cNvPr>
@@ -9203,7 +9315,7 @@
             <p:cNvPr id="7" name="직사각형 6">
               <a:extLst>
                 <a:ext uri="{FF2B5EF4-FFF2-40B4-BE49-F238E27FC236}">
-                  <a16:creationId xmlns="" xmlns:a16="http://schemas.microsoft.com/office/drawing/2014/main" id="{276F31AB-CE0B-4C60-A822-96C574A8736B}"/>
+                  <a16:creationId xmlns:a16="http://schemas.microsoft.com/office/drawing/2014/main" id="{276F31AB-CE0B-4C60-A822-96C574A8736B}"/>
                 </a:ext>
               </a:extLst>
             </p:cNvPr>
@@ -9314,7 +9426,7 @@
           <p:cNvPr id="8" name="Group 1">
             <a:extLst>
               <a:ext uri="{FF2B5EF4-FFF2-40B4-BE49-F238E27FC236}">
-                <a16:creationId xmlns="" xmlns:a16="http://schemas.microsoft.com/office/drawing/2014/main" id="{730BB671-9743-4819-9105-2FF86D4E0E36}"/>
+                <a16:creationId xmlns:a16="http://schemas.microsoft.com/office/drawing/2014/main" id="{730BB671-9743-4819-9105-2FF86D4E0E36}"/>
               </a:ext>
             </a:extLst>
           </p:cNvPr>
@@ -9334,7 +9446,7 @@
             <p:cNvPr id="9" name="직사각형 37">
               <a:extLst>
                 <a:ext uri="{FF2B5EF4-FFF2-40B4-BE49-F238E27FC236}">
-                  <a16:creationId xmlns="" xmlns:a16="http://schemas.microsoft.com/office/drawing/2014/main" id="{44B7DD30-17C5-4D7E-8AC2-EA4E01FBA36D}"/>
+                  <a16:creationId xmlns:a16="http://schemas.microsoft.com/office/drawing/2014/main" id="{44B7DD30-17C5-4D7E-8AC2-EA4E01FBA36D}"/>
                 </a:ext>
               </a:extLst>
             </p:cNvPr>
@@ -9389,19 +9501,6 @@
                 </a:spcAft>
               </a:pPr>
               <a:r>
-                <a:rPr lang="en-US" altLang="ko-KR" dirty="0" smtClean="0">
-                  <a:solidFill>
-                    <a:schemeClr val="tx1">
-                      <a:lumMod val="75000"/>
-                      <a:lumOff val="25000"/>
-                    </a:schemeClr>
-                  </a:solidFill>
-                  <a:latin typeface="SamsungOne 700" panose="020B0803030303020204" pitchFamily="34" charset="0"/>
-                  <a:ea typeface="SamsungOne 700" panose="020B0803030303020204" pitchFamily="34" charset="0"/>
-                </a:rPr>
-                <a:t>Unit </a:t>
-              </a:r>
-              <a:r>
                 <a:rPr lang="en-US" altLang="ko-KR" dirty="0">
                   <a:solidFill>
                     <a:schemeClr val="tx1">
@@ -9412,7 +9511,7 @@
                   <a:latin typeface="SamsungOne 700" panose="020B0803030303020204" pitchFamily="34" charset="0"/>
                   <a:ea typeface="SamsungOne 700" panose="020B0803030303020204" pitchFamily="34" charset="0"/>
                 </a:rPr>
-                <a:t>2. Title</a:t>
+                <a:t>Unit 2. Title</a:t>
               </a:r>
             </a:p>
           </p:txBody>
@@ -9422,7 +9521,7 @@
             <p:cNvPr id="10" name="직사각형 38">
               <a:extLst>
                 <a:ext uri="{FF2B5EF4-FFF2-40B4-BE49-F238E27FC236}">
-                  <a16:creationId xmlns="" xmlns:a16="http://schemas.microsoft.com/office/drawing/2014/main" id="{0544C2E7-AEB2-4C9F-BC7B-16A176B1A6CD}"/>
+                  <a16:creationId xmlns:a16="http://schemas.microsoft.com/office/drawing/2014/main" id="{0544C2E7-AEB2-4C9F-BC7B-16A176B1A6CD}"/>
                 </a:ext>
               </a:extLst>
             </p:cNvPr>
@@ -9482,7 +9581,7 @@
             <p:cNvPr id="11" name="직사각형 39">
               <a:extLst>
                 <a:ext uri="{FF2B5EF4-FFF2-40B4-BE49-F238E27FC236}">
-                  <a16:creationId xmlns="" xmlns:a16="http://schemas.microsoft.com/office/drawing/2014/main" id="{8FF9FD52-A1FA-45F7-80A2-FC3AF69D82B2}"/>
+                  <a16:creationId xmlns:a16="http://schemas.microsoft.com/office/drawing/2014/main" id="{8FF9FD52-A1FA-45F7-80A2-FC3AF69D82B2}"/>
                 </a:ext>
               </a:extLst>
             </p:cNvPr>
@@ -9593,7 +9692,7 @@
           <p:cNvPr id="12" name="Group 1">
             <a:extLst>
               <a:ext uri="{FF2B5EF4-FFF2-40B4-BE49-F238E27FC236}">
-                <a16:creationId xmlns="" xmlns:a16="http://schemas.microsoft.com/office/drawing/2014/main" id="{99E1C113-2E13-42D7-B0BA-4B851632AACF}"/>
+                <a16:creationId xmlns:a16="http://schemas.microsoft.com/office/drawing/2014/main" id="{99E1C113-2E13-42D7-B0BA-4B851632AACF}"/>
               </a:ext>
             </a:extLst>
           </p:cNvPr>
@@ -9613,7 +9712,7 @@
             <p:cNvPr id="13" name="직사각형 37">
               <a:extLst>
                 <a:ext uri="{FF2B5EF4-FFF2-40B4-BE49-F238E27FC236}">
-                  <a16:creationId xmlns="" xmlns:a16="http://schemas.microsoft.com/office/drawing/2014/main" id="{B347DB6E-48AB-4ECB-AF93-4C89FBDF1471}"/>
+                  <a16:creationId xmlns:a16="http://schemas.microsoft.com/office/drawing/2014/main" id="{B347DB6E-48AB-4ECB-AF93-4C89FBDF1471}"/>
                 </a:ext>
               </a:extLst>
             </p:cNvPr>
@@ -9668,19 +9767,6 @@
                 </a:spcAft>
               </a:pPr>
               <a:r>
-                <a:rPr lang="en-US" altLang="ko-KR" dirty="0" smtClean="0">
-                  <a:solidFill>
-                    <a:schemeClr val="tx1">
-                      <a:lumMod val="75000"/>
-                      <a:lumOff val="25000"/>
-                    </a:schemeClr>
-                  </a:solidFill>
-                  <a:latin typeface="SamsungOne 700" panose="020B0803030303020204" pitchFamily="34" charset="0"/>
-                  <a:ea typeface="SamsungOne 700" panose="020B0803030303020204" pitchFamily="34" charset="0"/>
-                </a:rPr>
-                <a:t>Unit </a:t>
-              </a:r>
-              <a:r>
                 <a:rPr lang="en-US" altLang="ko-KR" dirty="0">
                   <a:solidFill>
                     <a:schemeClr val="tx1">
@@ -9691,7 +9777,7 @@
                   <a:latin typeface="SamsungOne 700" panose="020B0803030303020204" pitchFamily="34" charset="0"/>
                   <a:ea typeface="SamsungOne 700" panose="020B0803030303020204" pitchFamily="34" charset="0"/>
                 </a:rPr>
-                <a:t>3. Title</a:t>
+                <a:t>Unit 3. Title</a:t>
               </a:r>
             </a:p>
           </p:txBody>
@@ -9701,7 +9787,7 @@
             <p:cNvPr id="14" name="직사각형 38">
               <a:extLst>
                 <a:ext uri="{FF2B5EF4-FFF2-40B4-BE49-F238E27FC236}">
-                  <a16:creationId xmlns="" xmlns:a16="http://schemas.microsoft.com/office/drawing/2014/main" id="{0B90DCE9-673D-4E88-91C4-A7B10F5EEAE4}"/>
+                  <a16:creationId xmlns:a16="http://schemas.microsoft.com/office/drawing/2014/main" id="{0B90DCE9-673D-4E88-91C4-A7B10F5EEAE4}"/>
                 </a:ext>
               </a:extLst>
             </p:cNvPr>
@@ -9761,7 +9847,7 @@
             <p:cNvPr id="15" name="직사각형 39">
               <a:extLst>
                 <a:ext uri="{FF2B5EF4-FFF2-40B4-BE49-F238E27FC236}">
-                  <a16:creationId xmlns="" xmlns:a16="http://schemas.microsoft.com/office/drawing/2014/main" id="{2825410F-2C46-47C0-A8BD-61DC6D753D88}"/>
+                  <a16:creationId xmlns:a16="http://schemas.microsoft.com/office/drawing/2014/main" id="{2825410F-2C46-47C0-A8BD-61DC6D753D88}"/>
                 </a:ext>
               </a:extLst>
             </p:cNvPr>
@@ -9872,7 +9958,7 @@
           <p:cNvPr id="16" name="직사각형 133">
             <a:extLst>
               <a:ext uri="{FF2B5EF4-FFF2-40B4-BE49-F238E27FC236}">
-                <a16:creationId xmlns="" xmlns:a16="http://schemas.microsoft.com/office/drawing/2014/main" id="{71B9AA9E-B863-4155-9637-87088D8ED43A}"/>
+                <a16:creationId xmlns:a16="http://schemas.microsoft.com/office/drawing/2014/main" id="{71B9AA9E-B863-4155-9637-87088D8ED43A}"/>
               </a:ext>
             </a:extLst>
           </p:cNvPr>
@@ -9922,7 +10008,7 @@
           <a:lstStyle/>
           <a:p>
             <a:r>
-              <a:rPr lang="en-US" altLang="ko-KR" sz="2400" dirty="0" smtClean="0">
+              <a:rPr lang="en-US" altLang="ko-KR" sz="2400" dirty="0">
                 <a:solidFill>
                   <a:schemeClr val="bg1"/>
                 </a:solidFill>
@@ -9932,14 +10018,6 @@
               </a:rPr>
               <a:t>Project Name</a:t>
             </a:r>
-            <a:endParaRPr lang="en-US" altLang="ko-KR" sz="2400" dirty="0">
-              <a:solidFill>
-                <a:schemeClr val="bg1"/>
-              </a:solidFill>
-              <a:latin typeface="Samsung Sharp Sans" pitchFamily="2" charset="0"/>
-              <a:ea typeface="Samsung Sharp Sans" pitchFamily="2" charset="0"/>
-              <a:cs typeface="Samsung Sharp Sans" pitchFamily="2" charset="0"/>
-            </a:endParaRPr>
           </a:p>
         </p:txBody>
       </p:sp>
@@ -9978,7 +10056,7 @@
           <p:cNvPr id="2" name="제목 1">
             <a:extLst>
               <a:ext uri="{FF2B5EF4-FFF2-40B4-BE49-F238E27FC236}">
-                <a16:creationId xmlns="" xmlns:a16="http://schemas.microsoft.com/office/drawing/2014/main" id="{906547BD-7739-49E7-A1AB-5660D23FF318}"/>
+                <a16:creationId xmlns:a16="http://schemas.microsoft.com/office/drawing/2014/main" id="{906547BD-7739-49E7-A1AB-5660D23FF318}"/>
               </a:ext>
             </a:extLst>
           </p:cNvPr>
@@ -10007,7 +10085,7 @@
           <p:cNvPr id="3" name="텍스트 개체 틀 2">
             <a:extLst>
               <a:ext uri="{FF2B5EF4-FFF2-40B4-BE49-F238E27FC236}">
-                <a16:creationId xmlns="" xmlns:a16="http://schemas.microsoft.com/office/drawing/2014/main" id="{B8C115BB-982E-462D-A44C-030D3E23DAE6}"/>
+                <a16:creationId xmlns:a16="http://schemas.microsoft.com/office/drawing/2014/main" id="{B8C115BB-982E-462D-A44C-030D3E23DAE6}"/>
               </a:ext>
             </a:extLst>
           </p:cNvPr>
@@ -10036,7 +10114,7 @@
           <p:cNvPr id="4" name="텍스트 개체 틀 3">
             <a:extLst>
               <a:ext uri="{FF2B5EF4-FFF2-40B4-BE49-F238E27FC236}">
-                <a16:creationId xmlns="" xmlns:a16="http://schemas.microsoft.com/office/drawing/2014/main" id="{963D7A32-B228-4C31-A4C8-F46398C52720}"/>
+                <a16:creationId xmlns:a16="http://schemas.microsoft.com/office/drawing/2014/main" id="{963D7A32-B228-4C31-A4C8-F46398C52720}"/>
               </a:ext>
             </a:extLst>
           </p:cNvPr>
@@ -10065,7 +10143,7 @@
           <p:cNvPr id="5" name="텍스트 개체 틀 4">
             <a:extLst>
               <a:ext uri="{FF2B5EF4-FFF2-40B4-BE49-F238E27FC236}">
-                <a16:creationId xmlns="" xmlns:a16="http://schemas.microsoft.com/office/drawing/2014/main" id="{D6B544C2-6ECF-4B3B-B28D-1B5551F72E20}"/>
+                <a16:creationId xmlns:a16="http://schemas.microsoft.com/office/drawing/2014/main" id="{D6B544C2-6ECF-4B3B-B28D-1B5551F72E20}"/>
               </a:ext>
             </a:extLst>
           </p:cNvPr>
@@ -10094,7 +10172,7 @@
           <p:cNvPr id="6" name="텍스트 개체 틀 5">
             <a:extLst>
               <a:ext uri="{FF2B5EF4-FFF2-40B4-BE49-F238E27FC236}">
-                <a16:creationId xmlns="" xmlns:a16="http://schemas.microsoft.com/office/drawing/2014/main" id="{F17A5E5A-66EE-42B7-A47B-38D82A9818DC}"/>
+                <a16:creationId xmlns:a16="http://schemas.microsoft.com/office/drawing/2014/main" id="{F17A5E5A-66EE-42B7-A47B-38D82A9818DC}"/>
               </a:ext>
             </a:extLst>
           </p:cNvPr>
@@ -10123,7 +10201,7 @@
           <p:cNvPr id="7" name="텍스트 개체 틀 6">
             <a:extLst>
               <a:ext uri="{FF2B5EF4-FFF2-40B4-BE49-F238E27FC236}">
-                <a16:creationId xmlns="" xmlns:a16="http://schemas.microsoft.com/office/drawing/2014/main" id="{5D7BE4A2-6816-4C15-8CC8-6EEF7E4F9A24}"/>
+                <a16:creationId xmlns:a16="http://schemas.microsoft.com/office/drawing/2014/main" id="{5D7BE4A2-6816-4C15-8CC8-6EEF7E4F9A24}"/>
               </a:ext>
             </a:extLst>
           </p:cNvPr>
@@ -10140,15 +10218,14 @@
           <a:lstStyle/>
           <a:p>
             <a:r>
-              <a:rPr lang="en-US" altLang="ko-KR" dirty="0" smtClean="0"/>
+              <a:rPr lang="en-US" altLang="ko-KR" dirty="0"/>
               <a:t>Level-1</a:t>
             </a:r>
-            <a:endParaRPr lang="en-US" altLang="ko-KR" dirty="0"/>
           </a:p>
           <a:p>
             <a:pPr lvl="1"/>
             <a:r>
-              <a:rPr lang="en-US" altLang="ko-KR" dirty="0" smtClean="0"/>
+              <a:rPr lang="en-US" altLang="ko-KR" dirty="0"/>
               <a:t>Level-2</a:t>
             </a:r>
             <a:endParaRPr lang="ko-KR" altLang="en-US" dirty="0"/>
@@ -10160,7 +10237,7 @@
           <p:cNvPr id="8" name="Speech Bubble: Rectangle 3">
             <a:extLst>
               <a:ext uri="{FF2B5EF4-FFF2-40B4-BE49-F238E27FC236}">
-                <a16:creationId xmlns="" xmlns:a16="http://schemas.microsoft.com/office/drawing/2014/main" id="{E80EB278-3D10-47EF-9C4C-A281925E1178}"/>
+                <a16:creationId xmlns:a16="http://schemas.microsoft.com/office/drawing/2014/main" id="{E80EB278-3D10-47EF-9C4C-A281925E1178}"/>
               </a:ext>
             </a:extLst>
           </p:cNvPr>
@@ -10209,21 +10286,8 @@
                   <a:sysClr val="windowText" lastClr="000000"/>
                 </a:solidFill>
               </a:rPr>
-              <a:t>Please edit project name and page number in slide </a:t>
+              <a:t>Please edit project name and page number in slide master.</a:t>
             </a:r>
-            <a:r>
-              <a:rPr lang="en-US" altLang="ko-KR" sz="1400" dirty="0" smtClean="0">
-                <a:solidFill>
-                  <a:sysClr val="windowText" lastClr="000000"/>
-                </a:solidFill>
-              </a:rPr>
-              <a:t>master.</a:t>
-            </a:r>
-            <a:endParaRPr lang="en-US" altLang="ko-KR" sz="1400" dirty="0">
-              <a:solidFill>
-                <a:sysClr val="windowText" lastClr="000000"/>
-              </a:solidFill>
-            </a:endParaRPr>
           </a:p>
         </p:txBody>
       </p:sp>

</xml_diff>

<commit_message>
I had something fixed on these items.
</commit_message>
<xml_diff>
--- a/SIC_C&P_Hackathon Presentation Slide Template.pptx
+++ b/SIC_C&P_Hackathon Presentation Slide Template.pptx
@@ -234,7 +234,7 @@
           <a:p>
             <a:fld id="{E8B57C17-E6FD-4AF5-A787-31E9CCE99A85}" type="datetimeFigureOut">
               <a:rPr lang="ko-KR" altLang="en-US" smtClean="0"/>
-              <a:t>2025-01-14</a:t>
+              <a:t>2025-04-08</a:t>
             </a:fld>
             <a:endParaRPr lang="ko-KR" altLang="en-US" dirty="0"/>
           </a:p>
@@ -9118,8 +9118,12 @@
           </a:lstStyle>
           <a:p>
             <a:r>
+              <a:rPr lang="es-ES" altLang="ko-KR" dirty="0" err="1"/>
+              <a:t>Monday</a:t>
+            </a:r>
+            <a:r>
               <a:rPr lang="es-ES" altLang="ko-KR" dirty="0"/>
-              <a:t>Friday 24 de enero de 2025</a:t>
+              <a:t> 19 May 2025</a:t>
             </a:r>
             <a:endParaRPr lang="es-ES" dirty="0"/>
           </a:p>

</xml_diff>